<commit_message>
Kapitel 6 & 7
</commit_message>
<xml_diff>
--- a/manuels/sql_abfrage.pptx
+++ b/manuels/sql_abfrage.pptx
@@ -104,6 +104,11 @@
       </a:defRPr>
     </a:lvl9pPr>
   </p:defaultTextStyle>
+  <p:extLst>
+    <p:ext uri="{EFAFB233-063F-42B5-8137-9DF3F51BA10A}">
+      <p15:sldGuideLst xmlns:p15="http://schemas.microsoft.com/office/powerpoint/2012/main"/>
+    </p:ext>
+  </p:extLst>
 </p:presentation>
 </file>
 
@@ -238,7 +243,7 @@
           <a:p>
             <a:fld id="{59A185E5-0B28-4F3C-A89A-637C9ECE8BB9}" type="datetimeFigureOut">
               <a:rPr lang="de-DE" smtClean="0"/>
-              <a:t>29.01.2014</a:t>
+              <a:t>24.02.2014</a:t>
             </a:fld>
             <a:endParaRPr lang="de-DE"/>
           </a:p>
@@ -408,7 +413,7 @@
           <a:p>
             <a:fld id="{59A185E5-0B28-4F3C-A89A-637C9ECE8BB9}" type="datetimeFigureOut">
               <a:rPr lang="de-DE" smtClean="0"/>
-              <a:t>29.01.2014</a:t>
+              <a:t>24.02.2014</a:t>
             </a:fld>
             <a:endParaRPr lang="de-DE"/>
           </a:p>
@@ -588,7 +593,7 @@
           <a:p>
             <a:fld id="{59A185E5-0B28-4F3C-A89A-637C9ECE8BB9}" type="datetimeFigureOut">
               <a:rPr lang="de-DE" smtClean="0"/>
-              <a:t>29.01.2014</a:t>
+              <a:t>24.02.2014</a:t>
             </a:fld>
             <a:endParaRPr lang="de-DE"/>
           </a:p>
@@ -758,7 +763,7 @@
           <a:p>
             <a:fld id="{59A185E5-0B28-4F3C-A89A-637C9ECE8BB9}" type="datetimeFigureOut">
               <a:rPr lang="de-DE" smtClean="0"/>
-              <a:t>29.01.2014</a:t>
+              <a:t>24.02.2014</a:t>
             </a:fld>
             <a:endParaRPr lang="de-DE"/>
           </a:p>
@@ -1004,7 +1009,7 @@
           <a:p>
             <a:fld id="{59A185E5-0B28-4F3C-A89A-637C9ECE8BB9}" type="datetimeFigureOut">
               <a:rPr lang="de-DE" smtClean="0"/>
-              <a:t>29.01.2014</a:t>
+              <a:t>24.02.2014</a:t>
             </a:fld>
             <a:endParaRPr lang="de-DE"/>
           </a:p>
@@ -1236,7 +1241,7 @@
           <a:p>
             <a:fld id="{59A185E5-0B28-4F3C-A89A-637C9ECE8BB9}" type="datetimeFigureOut">
               <a:rPr lang="de-DE" smtClean="0"/>
-              <a:t>29.01.2014</a:t>
+              <a:t>24.02.2014</a:t>
             </a:fld>
             <a:endParaRPr lang="de-DE"/>
           </a:p>
@@ -1603,7 +1608,7 @@
           <a:p>
             <a:fld id="{59A185E5-0B28-4F3C-A89A-637C9ECE8BB9}" type="datetimeFigureOut">
               <a:rPr lang="de-DE" smtClean="0"/>
-              <a:t>29.01.2014</a:t>
+              <a:t>24.02.2014</a:t>
             </a:fld>
             <a:endParaRPr lang="de-DE"/>
           </a:p>
@@ -1721,7 +1726,7 @@
           <a:p>
             <a:fld id="{59A185E5-0B28-4F3C-A89A-637C9ECE8BB9}" type="datetimeFigureOut">
               <a:rPr lang="de-DE" smtClean="0"/>
-              <a:t>29.01.2014</a:t>
+              <a:t>24.02.2014</a:t>
             </a:fld>
             <a:endParaRPr lang="de-DE"/>
           </a:p>
@@ -1816,7 +1821,7 @@
           <a:p>
             <a:fld id="{59A185E5-0B28-4F3C-A89A-637C9ECE8BB9}" type="datetimeFigureOut">
               <a:rPr lang="de-DE" smtClean="0"/>
-              <a:t>29.01.2014</a:t>
+              <a:t>24.02.2014</a:t>
             </a:fld>
             <a:endParaRPr lang="de-DE"/>
           </a:p>
@@ -2093,7 +2098,7 @@
           <a:p>
             <a:fld id="{59A185E5-0B28-4F3C-A89A-637C9ECE8BB9}" type="datetimeFigureOut">
               <a:rPr lang="de-DE" smtClean="0"/>
-              <a:t>29.01.2014</a:t>
+              <a:t>24.02.2014</a:t>
             </a:fld>
             <a:endParaRPr lang="de-DE"/>
           </a:p>
@@ -2346,7 +2351,7 @@
           <a:p>
             <a:fld id="{59A185E5-0B28-4F3C-A89A-637C9ECE8BB9}" type="datetimeFigureOut">
               <a:rPr lang="de-DE" smtClean="0"/>
-              <a:t>29.01.2014</a:t>
+              <a:t>24.02.2014</a:t>
             </a:fld>
             <a:endParaRPr lang="de-DE"/>
           </a:p>
@@ -2559,7 +2564,7 @@
           <a:p>
             <a:fld id="{59A185E5-0B28-4F3C-A89A-637C9ECE8BB9}" type="datetimeFigureOut">
               <a:rPr lang="de-DE" smtClean="0"/>
-              <a:t>29.01.2014</a:t>
+              <a:t>24.02.2014</a:t>
             </a:fld>
             <a:endParaRPr lang="de-DE"/>
           </a:p>
@@ -3003,7 +3008,7 @@
                     <a:p>
                       <a:pPr algn="ctr" fontAlgn="b"/>
                       <a:r>
-                        <a:rPr lang="de-DE" sz="1000" u="none" strike="noStrike" dirty="0" err="1">
+                        <a:rPr lang="de-DE" sz="1000" u="none" strike="noStrike" dirty="0">
                           <a:effectLst/>
                         </a:rPr>
                         <a:t>startID</a:t>
@@ -7603,7 +7608,7 @@
                     <a:p>
                       <a:pPr algn="ctr" fontAlgn="b"/>
                       <a:r>
-                        <a:rPr lang="de-DE" sz="1100" u="none" strike="noStrike" dirty="0" err="1">
+                        <a:rPr lang="de-DE" sz="1100" u="none" strike="noStrike" dirty="0">
                           <a:effectLst/>
                         </a:rPr>
                         <a:t>startID</a:t>
@@ -9271,7 +9276,7 @@
                     <a:p>
                       <a:pPr algn="ctr" fontAlgn="b"/>
                       <a:r>
-                        <a:rPr lang="de-DE" sz="1100" u="none" strike="noStrike" dirty="0" err="1">
+                        <a:rPr lang="de-DE" sz="1100" u="none" strike="noStrike" dirty="0">
                           <a:effectLst/>
                         </a:rPr>
                         <a:t>startID</a:t>
@@ -9294,7 +9299,7 @@
                     <a:p>
                       <a:pPr algn="ctr" fontAlgn="b"/>
                       <a:r>
-                        <a:rPr lang="de-DE" sz="1100" u="none" strike="noStrike" dirty="0" err="1">
+                        <a:rPr lang="de-DE" sz="1100" u="none" strike="noStrike" dirty="0">
                           <a:effectLst/>
                         </a:rPr>
                         <a:t>sum</a:t>
@@ -10489,7 +10494,7 @@
         <p:spPr>
           <a:xfrm>
             <a:off x="3832225" y="443756"/>
-            <a:ext cx="2851150" cy="707886"/>
+            <a:ext cx="2851150" cy="400110"/>
           </a:xfrm>
           <a:prstGeom prst="rect">
             <a:avLst/>
@@ -10509,7 +10514,15 @@
                   <a:schemeClr val="accent1"/>
                 </a:solidFill>
               </a:rPr>
-              <a:t>Resultat der inneren Query</a:t>
+              <a:t>Resultat der </a:t>
+            </a:r>
+            <a:r>
+              <a:rPr lang="de-DE" sz="2000" dirty="0" smtClean="0">
+                <a:solidFill>
+                  <a:schemeClr val="accent1"/>
+                </a:solidFill>
+              </a:rPr>
+              <a:t>ersten Query</a:t>
             </a:r>
             <a:endParaRPr lang="de-DE" sz="2000" dirty="0">
               <a:solidFill>
@@ -10548,7 +10561,23 @@
                   <a:schemeClr val="accent1"/>
                 </a:solidFill>
               </a:rPr>
-              <a:t>Resultat der äußeren Query</a:t>
+              <a:t>Resultat der </a:t>
+            </a:r>
+            <a:r>
+              <a:rPr lang="de-DE" sz="2000" dirty="0" smtClean="0">
+                <a:solidFill>
+                  <a:schemeClr val="accent1"/>
+                </a:solidFill>
+              </a:rPr>
+              <a:t>zweiten </a:t>
+            </a:r>
+            <a:r>
+              <a:rPr lang="de-DE" sz="2000" dirty="0" smtClean="0">
+                <a:solidFill>
+                  <a:schemeClr val="accent1"/>
+                </a:solidFill>
+              </a:rPr>
+              <a:t>Query</a:t>
             </a:r>
           </a:p>
           <a:p>

</xml_diff>